<commit_message>
Font correction for 1 and 2st lessons
1- three function for HW_1_CV

2 step - one function putText()

2 step - write my name on English, because appeare error

4 step - watch a exemple

5 step

6 step - IT WORKS!!!
</commit_message>
<xml_diff>
--- a/Presentations/ЭЛИНС. Занятие 1.pptx
+++ b/Presentations/ЭЛИНС. Занятие 1.pptx
@@ -10780,7 +10780,7 @@
                 <a:srgbClr val="FFFFFF"/>
               </a:buClr>
               <a:buSzPts val="1700"/>
-              <a:buFont typeface="Lato"/>
+              <a:buFont typeface="Times New Roman"/>
               <a:buChar char="●"/>
             </a:pPr>
             <a:r>
@@ -10788,10 +10788,10 @@
                 <a:solidFill>
                   <a:srgbClr val="FFFFFF"/>
                 </a:solidFill>
-                <a:latin typeface="Lato"/>
-                <a:ea typeface="Lato"/>
-                <a:cs typeface="Lato"/>
-                <a:sym typeface="Lato"/>
+                <a:latin typeface="Times New Roman"/>
+                <a:ea typeface="Times New Roman"/>
+                <a:cs typeface="Times New Roman"/>
+                <a:sym typeface="Times New Roman"/>
               </a:rPr>
               <a:t>Работают непосредственно с пикселями изображения;</a:t>
             </a:r>
@@ -10799,10 +10799,10 @@
               <a:solidFill>
                 <a:srgbClr val="FFFFFF"/>
               </a:solidFill>
-              <a:latin typeface="Lato"/>
-              <a:ea typeface="Lato"/>
-              <a:cs typeface="Lato"/>
-              <a:sym typeface="Lato"/>
+              <a:latin typeface="Times New Roman"/>
+              <a:ea typeface="Times New Roman"/>
+              <a:cs typeface="Times New Roman"/>
+              <a:sym typeface="Times New Roman"/>
             </a:endParaRPr>
           </a:p>
           <a:p>
@@ -10822,10 +10822,10 @@
               <a:solidFill>
                 <a:srgbClr val="FFFFFF"/>
               </a:solidFill>
-              <a:latin typeface="Lato"/>
-              <a:ea typeface="Lato"/>
-              <a:cs typeface="Lato"/>
-              <a:sym typeface="Lato"/>
+              <a:latin typeface="Times New Roman"/>
+              <a:ea typeface="Times New Roman"/>
+              <a:cs typeface="Times New Roman"/>
+              <a:sym typeface="Times New Roman"/>
             </a:endParaRPr>
           </a:p>
           <a:p>
@@ -10840,7 +10840,7 @@
                 <a:srgbClr val="FFFFFF"/>
               </a:buClr>
               <a:buSzPts val="1700"/>
-              <a:buFont typeface="Lato"/>
+              <a:buFont typeface="Times New Roman"/>
               <a:buChar char="●"/>
             </a:pPr>
             <a:r>
@@ -10848,10 +10848,10 @@
                 <a:solidFill>
                   <a:srgbClr val="FFFFFF"/>
                 </a:solidFill>
-                <a:latin typeface="Lato"/>
-                <a:ea typeface="Lato"/>
-                <a:cs typeface="Lato"/>
-                <a:sym typeface="Lato"/>
+                <a:latin typeface="Times New Roman"/>
+                <a:ea typeface="Times New Roman"/>
+                <a:cs typeface="Times New Roman"/>
+                <a:sym typeface="Times New Roman"/>
               </a:rPr>
               <a:t>Используются эвристики;</a:t>
             </a:r>
@@ -10859,10 +10859,10 @@
               <a:solidFill>
                 <a:srgbClr val="FFFFFF"/>
               </a:solidFill>
-              <a:latin typeface="Lato"/>
-              <a:ea typeface="Lato"/>
-              <a:cs typeface="Lato"/>
-              <a:sym typeface="Lato"/>
+              <a:latin typeface="Times New Roman"/>
+              <a:ea typeface="Times New Roman"/>
+              <a:cs typeface="Times New Roman"/>
+              <a:sym typeface="Times New Roman"/>
             </a:endParaRPr>
           </a:p>
           <a:p>
@@ -10882,10 +10882,10 @@
               <a:solidFill>
                 <a:srgbClr val="FFFFFF"/>
               </a:solidFill>
-              <a:latin typeface="Lato"/>
-              <a:ea typeface="Lato"/>
-              <a:cs typeface="Lato"/>
-              <a:sym typeface="Lato"/>
+              <a:latin typeface="Times New Roman"/>
+              <a:ea typeface="Times New Roman"/>
+              <a:cs typeface="Times New Roman"/>
+              <a:sym typeface="Times New Roman"/>
             </a:endParaRPr>
           </a:p>
           <a:p>
@@ -10900,7 +10900,7 @@
                 <a:srgbClr val="FFFFFF"/>
               </a:buClr>
               <a:buSzPts val="1700"/>
-              <a:buFont typeface="Lato"/>
+              <a:buFont typeface="Times New Roman"/>
               <a:buChar char="●"/>
             </a:pPr>
             <a:r>
@@ -10908,10 +10908,10 @@
                 <a:solidFill>
                   <a:srgbClr val="FFFFFF"/>
                 </a:solidFill>
-                <a:latin typeface="Lato"/>
-                <a:ea typeface="Lato"/>
-                <a:cs typeface="Lato"/>
-                <a:sym typeface="Lato"/>
+                <a:latin typeface="Times New Roman"/>
+                <a:ea typeface="Times New Roman"/>
+                <a:cs typeface="Times New Roman"/>
+                <a:sym typeface="Times New Roman"/>
               </a:rPr>
               <a:t>Не применяется машинное обучение;</a:t>
             </a:r>
@@ -10919,10 +10919,10 @@
               <a:solidFill>
                 <a:srgbClr val="FFFFFF"/>
               </a:solidFill>
-              <a:latin typeface="Lato"/>
-              <a:ea typeface="Lato"/>
-              <a:cs typeface="Lato"/>
-              <a:sym typeface="Lato"/>
+              <a:latin typeface="Times New Roman"/>
+              <a:ea typeface="Times New Roman"/>
+              <a:cs typeface="Times New Roman"/>
+              <a:sym typeface="Times New Roman"/>
             </a:endParaRPr>
           </a:p>
         </p:txBody>
@@ -10963,7 +10963,7 @@
                 <a:srgbClr val="FFFFFF"/>
               </a:buClr>
               <a:buSzPts val="1700"/>
-              <a:buFont typeface="Lato"/>
+              <a:buFont typeface="Times New Roman"/>
               <a:buChar char="●"/>
             </a:pPr>
             <a:r>
@@ -10971,10 +10971,10 @@
                 <a:solidFill>
                   <a:srgbClr val="FFFFFF"/>
                 </a:solidFill>
-                <a:latin typeface="Lato"/>
-                <a:ea typeface="Lato"/>
-                <a:cs typeface="Lato"/>
-                <a:sym typeface="Lato"/>
+                <a:latin typeface="Times New Roman"/>
+                <a:ea typeface="Times New Roman"/>
+                <a:cs typeface="Times New Roman"/>
+                <a:sym typeface="Times New Roman"/>
               </a:rPr>
               <a:t>Отвечают на вопрос: “Что изображено? Где? и тд…”</a:t>
             </a:r>
@@ -10982,10 +10982,10 @@
               <a:solidFill>
                 <a:srgbClr val="FFFFFF"/>
               </a:solidFill>
-              <a:latin typeface="Lato"/>
-              <a:ea typeface="Lato"/>
-              <a:cs typeface="Lato"/>
-              <a:sym typeface="Lato"/>
+              <a:latin typeface="Times New Roman"/>
+              <a:ea typeface="Times New Roman"/>
+              <a:cs typeface="Times New Roman"/>
+              <a:sym typeface="Times New Roman"/>
             </a:endParaRPr>
           </a:p>
           <a:p>
@@ -11005,10 +11005,10 @@
               <a:solidFill>
                 <a:srgbClr val="FFFFFF"/>
               </a:solidFill>
-              <a:latin typeface="Lato"/>
-              <a:ea typeface="Lato"/>
-              <a:cs typeface="Lato"/>
-              <a:sym typeface="Lato"/>
+              <a:latin typeface="Times New Roman"/>
+              <a:ea typeface="Times New Roman"/>
+              <a:cs typeface="Times New Roman"/>
+              <a:sym typeface="Times New Roman"/>
             </a:endParaRPr>
           </a:p>
           <a:p>
@@ -11023,7 +11023,7 @@
                 <a:srgbClr val="FFFFFF"/>
               </a:buClr>
               <a:buSzPts val="1700"/>
-              <a:buFont typeface="Lato"/>
+              <a:buFont typeface="Times New Roman"/>
               <a:buChar char="●"/>
             </a:pPr>
             <a:r>
@@ -11031,10 +11031,10 @@
                 <a:solidFill>
                   <a:srgbClr val="FFFFFF"/>
                 </a:solidFill>
-                <a:latin typeface="Lato"/>
-                <a:ea typeface="Lato"/>
-                <a:cs typeface="Lato"/>
-                <a:sym typeface="Lato"/>
+                <a:latin typeface="Times New Roman"/>
+                <a:ea typeface="Times New Roman"/>
+                <a:cs typeface="Times New Roman"/>
+                <a:sym typeface="Times New Roman"/>
               </a:rPr>
               <a:t>Более абстрактные</a:t>
             </a:r>
@@ -11042,10 +11042,10 @@
               <a:solidFill>
                 <a:srgbClr val="FFFFFF"/>
               </a:solidFill>
-              <a:latin typeface="Lato"/>
-              <a:ea typeface="Lato"/>
-              <a:cs typeface="Lato"/>
-              <a:sym typeface="Lato"/>
+              <a:latin typeface="Times New Roman"/>
+              <a:ea typeface="Times New Roman"/>
+              <a:cs typeface="Times New Roman"/>
+              <a:sym typeface="Times New Roman"/>
             </a:endParaRPr>
           </a:p>
           <a:p>
@@ -11065,10 +11065,10 @@
               <a:solidFill>
                 <a:srgbClr val="FFFFFF"/>
               </a:solidFill>
-              <a:latin typeface="Lato"/>
-              <a:ea typeface="Lato"/>
-              <a:cs typeface="Lato"/>
-              <a:sym typeface="Lato"/>
+              <a:latin typeface="Times New Roman"/>
+              <a:ea typeface="Times New Roman"/>
+              <a:cs typeface="Times New Roman"/>
+              <a:sym typeface="Times New Roman"/>
             </a:endParaRPr>
           </a:p>
           <a:p>
@@ -11083,7 +11083,7 @@
                 <a:srgbClr val="FFFFFF"/>
               </a:buClr>
               <a:buSzPts val="1700"/>
-              <a:buFont typeface="Lato"/>
+              <a:buFont typeface="Times New Roman"/>
               <a:buChar char="●"/>
             </a:pPr>
             <a:r>
@@ -11091,10 +11091,10 @@
                 <a:solidFill>
                   <a:srgbClr val="FFFFFF"/>
                 </a:solidFill>
-                <a:latin typeface="Lato"/>
-                <a:ea typeface="Lato"/>
-                <a:cs typeface="Lato"/>
-                <a:sym typeface="Lato"/>
+                <a:latin typeface="Times New Roman"/>
+                <a:ea typeface="Times New Roman"/>
+                <a:cs typeface="Times New Roman"/>
+                <a:sym typeface="Times New Roman"/>
               </a:rPr>
               <a:t>Часто используется машинное обучение и deep learning </a:t>
             </a:r>
@@ -11102,10 +11102,10 @@
               <a:solidFill>
                 <a:srgbClr val="FFFFFF"/>
               </a:solidFill>
-              <a:latin typeface="Lato"/>
-              <a:ea typeface="Lato"/>
-              <a:cs typeface="Lato"/>
-              <a:sym typeface="Lato"/>
+              <a:latin typeface="Times New Roman"/>
+              <a:ea typeface="Times New Roman"/>
+              <a:cs typeface="Times New Roman"/>
+              <a:sym typeface="Times New Roman"/>
             </a:endParaRPr>
           </a:p>
         </p:txBody>
@@ -11471,17 +11471,37 @@
               <a:buNone/>
             </a:pPr>
             <a:r>
-              <a:rPr lang="ru" sz="1600"/>
+              <a:rPr lang="ru" sz="1600">
+                <a:latin typeface="Times New Roman"/>
+                <a:ea typeface="Times New Roman"/>
+                <a:cs typeface="Times New Roman"/>
+                <a:sym typeface="Times New Roman"/>
+              </a:rPr>
               <a:t>Организация. Краткий обзор курса </a:t>
             </a:r>
             <a:br>
-              <a:rPr lang="ru" sz="1600"/>
+              <a:rPr lang="ru" sz="1600">
+                <a:latin typeface="Times New Roman"/>
+                <a:ea typeface="Times New Roman"/>
+                <a:cs typeface="Times New Roman"/>
+                <a:sym typeface="Times New Roman"/>
+              </a:rPr>
             </a:br>
             <a:r>
-              <a:rPr lang="ru" sz="1600"/>
+              <a:rPr lang="ru" sz="1600">
+                <a:latin typeface="Times New Roman"/>
+                <a:ea typeface="Times New Roman"/>
+                <a:cs typeface="Times New Roman"/>
+                <a:sym typeface="Times New Roman"/>
+              </a:rPr>
               <a:t>(1 занятие)</a:t>
             </a:r>
-            <a:endParaRPr sz="1600"/>
+            <a:endParaRPr sz="1600">
+              <a:latin typeface="Times New Roman"/>
+              <a:ea typeface="Times New Roman"/>
+              <a:cs typeface="Times New Roman"/>
+              <a:sym typeface="Times New Roman"/>
+            </a:endParaRPr>
           </a:p>
         </p:txBody>
       </p:sp>
@@ -11700,17 +11720,37 @@
               <a:buNone/>
             </a:pPr>
             <a:r>
-              <a:rPr lang="ru" sz="1600"/>
+              <a:rPr lang="ru" sz="1600">
+                <a:latin typeface="Times New Roman"/>
+                <a:ea typeface="Times New Roman"/>
+                <a:cs typeface="Times New Roman"/>
+                <a:sym typeface="Times New Roman"/>
+              </a:rPr>
               <a:t>Знакомство с функционалом библиотеки </a:t>
             </a:r>
             <a:br>
-              <a:rPr lang="ru" sz="1600"/>
+              <a:rPr lang="ru" sz="1600">
+                <a:latin typeface="Times New Roman"/>
+                <a:ea typeface="Times New Roman"/>
+                <a:cs typeface="Times New Roman"/>
+                <a:sym typeface="Times New Roman"/>
+              </a:rPr>
             </a:br>
             <a:r>
-              <a:rPr lang="ru" sz="1600"/>
+              <a:rPr lang="ru" sz="1600">
+                <a:latin typeface="Times New Roman"/>
+                <a:ea typeface="Times New Roman"/>
+                <a:cs typeface="Times New Roman"/>
+                <a:sym typeface="Times New Roman"/>
+              </a:rPr>
               <a:t>(от 2 занятий)</a:t>
             </a:r>
-            <a:endParaRPr sz="1600"/>
+            <a:endParaRPr sz="1600">
+              <a:latin typeface="Times New Roman"/>
+              <a:ea typeface="Times New Roman"/>
+              <a:cs typeface="Times New Roman"/>
+              <a:sym typeface="Times New Roman"/>
+            </a:endParaRPr>
           </a:p>
           <a:p>
             <a:pPr indent="0" lvl="0" marL="0" rtl="0" algn="l">
@@ -11725,7 +11765,12 @@
             <a:r>
               <a:t/>
             </a:r>
-            <a:endParaRPr sz="1600"/>
+            <a:endParaRPr sz="1600">
+              <a:latin typeface="Times New Roman"/>
+              <a:ea typeface="Times New Roman"/>
+              <a:cs typeface="Times New Roman"/>
+              <a:sym typeface="Times New Roman"/>
+            </a:endParaRPr>
           </a:p>
         </p:txBody>
       </p:sp>
@@ -11944,17 +11989,37 @@
               <a:buNone/>
             </a:pPr>
             <a:r>
-              <a:rPr lang="ru" sz="1600"/>
+              <a:rPr lang="ru" sz="1600">
+                <a:latin typeface="Times New Roman"/>
+                <a:ea typeface="Times New Roman"/>
+                <a:cs typeface="Times New Roman"/>
+                <a:sym typeface="Times New Roman"/>
+              </a:rPr>
               <a:t>Поверхностное знакомство с низкоуровневыми алгоритмами</a:t>
             </a:r>
             <a:br>
-              <a:rPr lang="ru" sz="1600"/>
+              <a:rPr lang="ru" sz="1600">
+                <a:latin typeface="Times New Roman"/>
+                <a:ea typeface="Times New Roman"/>
+                <a:cs typeface="Times New Roman"/>
+                <a:sym typeface="Times New Roman"/>
+              </a:rPr>
             </a:br>
             <a:r>
-              <a:rPr lang="ru" sz="1600"/>
+              <a:rPr lang="ru" sz="1600">
+                <a:latin typeface="Times New Roman"/>
+                <a:ea typeface="Times New Roman"/>
+                <a:cs typeface="Times New Roman"/>
+                <a:sym typeface="Times New Roman"/>
+              </a:rPr>
               <a:t>(от 3 занятий)</a:t>
             </a:r>
-            <a:endParaRPr sz="1600"/>
+            <a:endParaRPr sz="1600">
+              <a:latin typeface="Times New Roman"/>
+              <a:ea typeface="Times New Roman"/>
+              <a:cs typeface="Times New Roman"/>
+              <a:sym typeface="Times New Roman"/>
+            </a:endParaRPr>
           </a:p>
           <a:p>
             <a:pPr indent="0" lvl="0" marL="0" rtl="0" algn="l">
@@ -11969,7 +12034,12 @@
             <a:r>
               <a:t/>
             </a:r>
-            <a:endParaRPr sz="1600"/>
+            <a:endParaRPr sz="1600">
+              <a:latin typeface="Times New Roman"/>
+              <a:ea typeface="Times New Roman"/>
+              <a:cs typeface="Times New Roman"/>
+              <a:sym typeface="Times New Roman"/>
+            </a:endParaRPr>
           </a:p>
         </p:txBody>
       </p:sp>
@@ -12188,17 +12258,37 @@
               <a:buNone/>
             </a:pPr>
             <a:r>
-              <a:rPr lang="ru" sz="1600"/>
+              <a:rPr lang="ru" sz="1600">
+                <a:latin typeface="Times New Roman"/>
+                <a:ea typeface="Times New Roman"/>
+                <a:cs typeface="Times New Roman"/>
+                <a:sym typeface="Times New Roman"/>
+              </a:rPr>
               <a:t>Теория по нейронным сетям. Ознакомление с другими методами ML</a:t>
             </a:r>
             <a:br>
-              <a:rPr lang="ru" sz="1600"/>
+              <a:rPr lang="ru" sz="1600">
+                <a:latin typeface="Times New Roman"/>
+                <a:ea typeface="Times New Roman"/>
+                <a:cs typeface="Times New Roman"/>
+                <a:sym typeface="Times New Roman"/>
+              </a:rPr>
             </a:br>
             <a:r>
-              <a:rPr lang="ru" sz="1600"/>
+              <a:rPr lang="ru" sz="1600">
+                <a:latin typeface="Times New Roman"/>
+                <a:ea typeface="Times New Roman"/>
+                <a:cs typeface="Times New Roman"/>
+                <a:sym typeface="Times New Roman"/>
+              </a:rPr>
               <a:t>(1-2 занятия)</a:t>
             </a:r>
-            <a:endParaRPr sz="1600"/>
+            <a:endParaRPr sz="1600">
+              <a:latin typeface="Times New Roman"/>
+              <a:ea typeface="Times New Roman"/>
+              <a:cs typeface="Times New Roman"/>
+              <a:sym typeface="Times New Roman"/>
+            </a:endParaRPr>
           </a:p>
           <a:p>
             <a:pPr indent="0" lvl="0" marL="0" rtl="0" algn="l">
@@ -12213,7 +12303,12 @@
             <a:r>
               <a:t/>
             </a:r>
-            <a:endParaRPr sz="1600"/>
+            <a:endParaRPr sz="1600">
+              <a:latin typeface="Times New Roman"/>
+              <a:ea typeface="Times New Roman"/>
+              <a:cs typeface="Times New Roman"/>
+              <a:sym typeface="Times New Roman"/>
+            </a:endParaRPr>
           </a:p>
         </p:txBody>
       </p:sp>
@@ -12432,17 +12527,37 @@
               <a:buNone/>
             </a:pPr>
             <a:r>
-              <a:rPr lang="ru" sz="1600"/>
+              <a:rPr lang="ru" sz="1600">
+                <a:latin typeface="Times New Roman"/>
+                <a:ea typeface="Times New Roman"/>
+                <a:cs typeface="Times New Roman"/>
+                <a:sym typeface="Times New Roman"/>
+              </a:rPr>
               <a:t>Знакомство с фрэймворком машинного обучения</a:t>
             </a:r>
             <a:br>
-              <a:rPr lang="ru" sz="1600"/>
+              <a:rPr lang="ru" sz="1600">
+                <a:latin typeface="Times New Roman"/>
+                <a:ea typeface="Times New Roman"/>
+                <a:cs typeface="Times New Roman"/>
+                <a:sym typeface="Times New Roman"/>
+              </a:rPr>
             </a:br>
             <a:r>
-              <a:rPr lang="ru" sz="1600"/>
+              <a:rPr lang="ru" sz="1600">
+                <a:latin typeface="Times New Roman"/>
+                <a:ea typeface="Times New Roman"/>
+                <a:cs typeface="Times New Roman"/>
+                <a:sym typeface="Times New Roman"/>
+              </a:rPr>
               <a:t>(Бесконечность)</a:t>
             </a:r>
-            <a:endParaRPr sz="1600"/>
+            <a:endParaRPr sz="1600">
+              <a:latin typeface="Times New Roman"/>
+              <a:ea typeface="Times New Roman"/>
+              <a:cs typeface="Times New Roman"/>
+              <a:sym typeface="Times New Roman"/>
+            </a:endParaRPr>
           </a:p>
           <a:p>
             <a:pPr indent="0" lvl="0" marL="0" rtl="0" algn="l">
@@ -12457,7 +12572,12 @@
             <a:r>
               <a:t/>
             </a:r>
-            <a:endParaRPr sz="1600"/>
+            <a:endParaRPr sz="1600">
+              <a:latin typeface="Times New Roman"/>
+              <a:ea typeface="Times New Roman"/>
+              <a:cs typeface="Times New Roman"/>
+              <a:sym typeface="Times New Roman"/>
+            </a:endParaRPr>
           </a:p>
         </p:txBody>
       </p:sp>
@@ -12753,13 +12873,24 @@
                 <a:spcPts val="0"/>
               </a:spcAft>
               <a:buSzPts val="2400"/>
+              <a:buFont typeface="Times New Roman"/>
               <a:buChar char="●"/>
             </a:pPr>
             <a:r>
-              <a:rPr lang="ru" sz="2400"/>
+              <a:rPr lang="ru" sz="2400">
+                <a:latin typeface="Times New Roman"/>
+                <a:ea typeface="Times New Roman"/>
+                <a:cs typeface="Times New Roman"/>
+                <a:sym typeface="Times New Roman"/>
+              </a:rPr>
               <a:t>Индивидуальные варианты</a:t>
             </a:r>
-            <a:endParaRPr sz="2400"/>
+            <a:endParaRPr sz="2400">
+              <a:latin typeface="Times New Roman"/>
+              <a:ea typeface="Times New Roman"/>
+              <a:cs typeface="Times New Roman"/>
+              <a:sym typeface="Times New Roman"/>
+            </a:endParaRPr>
           </a:p>
           <a:p>
             <a:pPr indent="-381000" lvl="0" marL="457200" rtl="0" algn="l">
@@ -12770,13 +12901,24 @@
                 <a:spcPts val="0"/>
               </a:spcAft>
               <a:buSzPts val="2400"/>
+              <a:buFont typeface="Times New Roman"/>
               <a:buChar char="●"/>
             </a:pPr>
             <a:r>
-              <a:rPr lang="ru" sz="2400"/>
+              <a:rPr lang="ru" sz="2400">
+                <a:latin typeface="Times New Roman"/>
+                <a:ea typeface="Times New Roman"/>
+                <a:cs typeface="Times New Roman"/>
+                <a:sym typeface="Times New Roman"/>
+              </a:rPr>
               <a:t>GitHub (учимся хорошему)</a:t>
             </a:r>
-            <a:endParaRPr sz="2400"/>
+            <a:endParaRPr sz="2400">
+              <a:latin typeface="Times New Roman"/>
+              <a:ea typeface="Times New Roman"/>
+              <a:cs typeface="Times New Roman"/>
+              <a:sym typeface="Times New Roman"/>
+            </a:endParaRPr>
           </a:p>
           <a:p>
             <a:pPr indent="-381000" lvl="0" marL="457200" rtl="0" algn="l">
@@ -12787,13 +12929,24 @@
                 <a:spcPts val="0"/>
               </a:spcAft>
               <a:buSzPts val="2400"/>
+              <a:buFont typeface="Times New Roman"/>
               <a:buChar char="●"/>
             </a:pPr>
             <a:r>
-              <a:rPr lang="ru" sz="2400"/>
+              <a:rPr lang="ru" sz="2400">
+                <a:latin typeface="Times New Roman"/>
+                <a:ea typeface="Times New Roman"/>
+                <a:cs typeface="Times New Roman"/>
+                <a:sym typeface="Times New Roman"/>
+              </a:rPr>
               <a:t>Выполнение желательно, но не обязательно</a:t>
             </a:r>
-            <a:endParaRPr sz="2400"/>
+            <a:endParaRPr sz="2400">
+              <a:latin typeface="Times New Roman"/>
+              <a:ea typeface="Times New Roman"/>
+              <a:cs typeface="Times New Roman"/>
+              <a:sym typeface="Times New Roman"/>
+            </a:endParaRPr>
           </a:p>
           <a:p>
             <a:pPr indent="-381000" lvl="0" marL="457200" rtl="0" algn="l">
@@ -12804,13 +12957,24 @@
                 <a:spcPts val="0"/>
               </a:spcAft>
               <a:buSzPts val="2400"/>
+              <a:buFont typeface="Times New Roman"/>
               <a:buChar char="●"/>
             </a:pPr>
             <a:r>
-              <a:rPr lang="ru" sz="2400"/>
+              <a:rPr lang="ru" sz="2400">
+                <a:latin typeface="Times New Roman"/>
+                <a:ea typeface="Times New Roman"/>
+                <a:cs typeface="Times New Roman"/>
+                <a:sym typeface="Times New Roman"/>
+              </a:rPr>
               <a:t>Оценок нет</a:t>
             </a:r>
-            <a:endParaRPr sz="2400"/>
+            <a:endParaRPr sz="2400">
+              <a:latin typeface="Times New Roman"/>
+              <a:ea typeface="Times New Roman"/>
+              <a:cs typeface="Times New Roman"/>
+              <a:sym typeface="Times New Roman"/>
+            </a:endParaRPr>
           </a:p>
         </p:txBody>
       </p:sp>
@@ -13063,13 +13227,24 @@
                 <a:spcPts val="0"/>
               </a:spcAft>
               <a:buSzPts val="1800"/>
+              <a:buFont typeface="Times New Roman"/>
               <a:buChar char="●"/>
             </a:pPr>
             <a:r>
-              <a:rPr lang="ru" sz="1800"/>
+              <a:rPr lang="ru" sz="1800">
+                <a:latin typeface="Times New Roman"/>
+                <a:ea typeface="Times New Roman"/>
+                <a:cs typeface="Times New Roman"/>
+                <a:sym typeface="Times New Roman"/>
+              </a:rPr>
               <a:t>Предложения по самоорганизации;</a:t>
             </a:r>
-            <a:endParaRPr sz="1800"/>
+            <a:endParaRPr sz="1800">
+              <a:latin typeface="Times New Roman"/>
+              <a:ea typeface="Times New Roman"/>
+              <a:cs typeface="Times New Roman"/>
+              <a:sym typeface="Times New Roman"/>
+            </a:endParaRPr>
           </a:p>
           <a:p>
             <a:pPr indent="-342900" lvl="0" marL="457200" rtl="0" algn="l">
@@ -13080,13 +13255,24 @@
                 <a:spcPts val="0"/>
               </a:spcAft>
               <a:buSzPts val="1800"/>
+              <a:buFont typeface="Times New Roman"/>
               <a:buChar char="●"/>
             </a:pPr>
             <a:r>
-              <a:rPr lang="ru" sz="1800"/>
+              <a:rPr lang="ru" sz="1800">
+                <a:latin typeface="Times New Roman"/>
+                <a:ea typeface="Times New Roman"/>
+                <a:cs typeface="Times New Roman"/>
+                <a:sym typeface="Times New Roman"/>
+              </a:rPr>
               <a:t>Общие сведения об ИИ;</a:t>
             </a:r>
-            <a:endParaRPr sz="1800"/>
+            <a:endParaRPr sz="1800">
+              <a:latin typeface="Times New Roman"/>
+              <a:ea typeface="Times New Roman"/>
+              <a:cs typeface="Times New Roman"/>
+              <a:sym typeface="Times New Roman"/>
+            </a:endParaRPr>
           </a:p>
           <a:p>
             <a:pPr indent="-342900" lvl="0" marL="457200" rtl="0" algn="l">
@@ -13097,13 +13283,24 @@
                 <a:spcPts val="0"/>
               </a:spcAft>
               <a:buSzPts val="1800"/>
+              <a:buFont typeface="Times New Roman"/>
               <a:buChar char="●"/>
             </a:pPr>
             <a:r>
-              <a:rPr lang="ru" sz="1800"/>
+              <a:rPr lang="ru" sz="1800">
+                <a:latin typeface="Times New Roman"/>
+                <a:ea typeface="Times New Roman"/>
+                <a:cs typeface="Times New Roman"/>
+                <a:sym typeface="Times New Roman"/>
+              </a:rPr>
               <a:t>Конкретно о Computer Vision (CV);</a:t>
             </a:r>
-            <a:endParaRPr sz="1800"/>
+            <a:endParaRPr sz="1800">
+              <a:latin typeface="Times New Roman"/>
+              <a:ea typeface="Times New Roman"/>
+              <a:cs typeface="Times New Roman"/>
+              <a:sym typeface="Times New Roman"/>
+            </a:endParaRPr>
           </a:p>
           <a:p>
             <a:pPr indent="-342900" lvl="0" marL="457200" rtl="0" algn="l">
@@ -13114,13 +13311,24 @@
                 <a:spcPts val="0"/>
               </a:spcAft>
               <a:buSzPts val="1800"/>
+              <a:buFont typeface="Times New Roman"/>
               <a:buChar char="●"/>
             </a:pPr>
             <a:r>
-              <a:rPr lang="ru" sz="1800"/>
+              <a:rPr lang="ru" sz="1800">
+                <a:latin typeface="Times New Roman"/>
+                <a:ea typeface="Times New Roman"/>
+                <a:cs typeface="Times New Roman"/>
+                <a:sym typeface="Times New Roman"/>
+              </a:rPr>
               <a:t>Примерный план курса;</a:t>
             </a:r>
-            <a:endParaRPr sz="1800"/>
+            <a:endParaRPr sz="1800">
+              <a:latin typeface="Times New Roman"/>
+              <a:ea typeface="Times New Roman"/>
+              <a:cs typeface="Times New Roman"/>
+              <a:sym typeface="Times New Roman"/>
+            </a:endParaRPr>
           </a:p>
           <a:p>
             <a:pPr indent="-342900" lvl="0" marL="457200" rtl="0" algn="l">
@@ -13131,13 +13339,24 @@
                 <a:spcPts val="1600"/>
               </a:spcAft>
               <a:buSzPts val="1800"/>
+              <a:buFont typeface="Times New Roman"/>
               <a:buChar char="●"/>
             </a:pPr>
             <a:r>
-              <a:rPr lang="ru" sz="1800"/>
+              <a:rPr lang="ru" sz="1800">
+                <a:latin typeface="Times New Roman"/>
+                <a:ea typeface="Times New Roman"/>
+                <a:cs typeface="Times New Roman"/>
+                <a:sym typeface="Times New Roman"/>
+              </a:rPr>
               <a:t>Формат ДЗ (самостоятельной работы);</a:t>
             </a:r>
-            <a:endParaRPr sz="1800"/>
+            <a:endParaRPr sz="1800">
+              <a:latin typeface="Times New Roman"/>
+              <a:ea typeface="Times New Roman"/>
+              <a:cs typeface="Times New Roman"/>
+              <a:sym typeface="Times New Roman"/>
+            </a:endParaRPr>
           </a:p>
         </p:txBody>
       </p:sp>
@@ -13917,14 +14136,29 @@
               <a:buNone/>
             </a:pPr>
             <a:r>
-              <a:rPr lang="ru" sz="1800" u="sng"/>
+              <a:rPr lang="ru" sz="1800" u="sng">
+                <a:latin typeface="Times New Roman"/>
+                <a:ea typeface="Times New Roman"/>
+                <a:cs typeface="Times New Roman"/>
+                <a:sym typeface="Times New Roman"/>
+              </a:rPr>
               <a:t>Искусственный интеллект (ИИ) </a:t>
             </a:r>
             <a:r>
-              <a:rPr lang="ru" sz="1800"/>
+              <a:rPr lang="ru" sz="1800">
+                <a:latin typeface="Times New Roman"/>
+                <a:ea typeface="Times New Roman"/>
+                <a:cs typeface="Times New Roman"/>
+                <a:sym typeface="Times New Roman"/>
+              </a:rPr>
               <a:t>— способность интеллектуальных машин выполнять творческие функции, которые традиционно считаются прерогативой человека. </a:t>
             </a:r>
-            <a:endParaRPr sz="1800"/>
+            <a:endParaRPr sz="1800">
+              <a:latin typeface="Times New Roman"/>
+              <a:ea typeface="Times New Roman"/>
+              <a:cs typeface="Times New Roman"/>
+              <a:sym typeface="Times New Roman"/>
+            </a:endParaRPr>
           </a:p>
           <a:p>
             <a:pPr indent="0" lvl="0" marL="0" rtl="0" algn="l">
@@ -13937,14 +14171,29 @@
               <a:buNone/>
             </a:pPr>
             <a:r>
-              <a:rPr i="1" lang="ru" sz="1800"/>
+              <a:rPr i="1" lang="ru" sz="1800">
+                <a:latin typeface="Times New Roman"/>
+                <a:ea typeface="Times New Roman"/>
+                <a:cs typeface="Times New Roman"/>
+                <a:sym typeface="Times New Roman"/>
+              </a:rPr>
               <a:t>Альтернативное определение</a:t>
             </a:r>
             <a:r>
-              <a:rPr lang="ru" sz="1800"/>
+              <a:rPr lang="ru" sz="1800">
+                <a:latin typeface="Times New Roman"/>
+                <a:ea typeface="Times New Roman"/>
+                <a:cs typeface="Times New Roman"/>
+                <a:sym typeface="Times New Roman"/>
+              </a:rPr>
               <a:t> - наука и технология создания интеллектуальных машин. </a:t>
             </a:r>
-            <a:endParaRPr sz="1800"/>
+            <a:endParaRPr sz="1800">
+              <a:latin typeface="Times New Roman"/>
+              <a:ea typeface="Times New Roman"/>
+              <a:cs typeface="Times New Roman"/>
+              <a:sym typeface="Times New Roman"/>
+            </a:endParaRPr>
           </a:p>
           <a:p>
             <a:pPr indent="0" lvl="0" marL="0" rtl="0" algn="l">
@@ -13957,18 +14206,38 @@
               <a:buNone/>
             </a:pPr>
             <a:r>
-              <a:rPr lang="ru" sz="1800"/>
+              <a:rPr lang="ru" sz="1800">
+                <a:latin typeface="Times New Roman"/>
+                <a:ea typeface="Times New Roman"/>
+                <a:cs typeface="Times New Roman"/>
+                <a:sym typeface="Times New Roman"/>
+              </a:rPr>
               <a:t>Впервые это определение было дано американским информатиком </a:t>
             </a:r>
             <a:r>
-              <a:rPr b="1" lang="ru" sz="1800"/>
+              <a:rPr b="1" lang="ru" sz="1800">
+                <a:latin typeface="Times New Roman"/>
+                <a:ea typeface="Times New Roman"/>
+                <a:cs typeface="Times New Roman"/>
+                <a:sym typeface="Times New Roman"/>
+              </a:rPr>
               <a:t>Джоном Маккарти</a:t>
             </a:r>
             <a:r>
-              <a:rPr lang="ru" sz="1800"/>
+              <a:rPr lang="ru" sz="1800">
+                <a:latin typeface="Times New Roman"/>
+                <a:ea typeface="Times New Roman"/>
+                <a:cs typeface="Times New Roman"/>
+                <a:sym typeface="Times New Roman"/>
+              </a:rPr>
               <a:t> в 1956 году.</a:t>
             </a:r>
-            <a:endParaRPr sz="1800"/>
+            <a:endParaRPr sz="1800">
+              <a:latin typeface="Times New Roman"/>
+              <a:ea typeface="Times New Roman"/>
+              <a:cs typeface="Times New Roman"/>
+              <a:sym typeface="Times New Roman"/>
+            </a:endParaRPr>
           </a:p>
         </p:txBody>
       </p:sp>
@@ -14832,10 +15101,10 @@
                 <a:solidFill>
                   <a:srgbClr val="FFFFFF"/>
                 </a:solidFill>
-                <a:latin typeface="Lato"/>
-                <a:ea typeface="Lato"/>
-                <a:cs typeface="Lato"/>
-                <a:sym typeface="Lato"/>
+                <a:latin typeface="Times New Roman"/>
+                <a:ea typeface="Times New Roman"/>
+                <a:cs typeface="Times New Roman"/>
+                <a:sym typeface="Times New Roman"/>
               </a:rPr>
               <a:t>Компьютерное зрение</a:t>
             </a:r>
@@ -14844,10 +15113,10 @@
                 <a:solidFill>
                   <a:srgbClr val="FFFFFF"/>
                 </a:solidFill>
-                <a:latin typeface="Lato"/>
-                <a:ea typeface="Lato"/>
-                <a:cs typeface="Lato"/>
-                <a:sym typeface="Lato"/>
+                <a:latin typeface="Times New Roman"/>
+                <a:ea typeface="Times New Roman"/>
+                <a:cs typeface="Times New Roman"/>
+                <a:sym typeface="Times New Roman"/>
               </a:rPr>
               <a:t> — это дисциплина (раздел искусственного интеллекта), которая занимается задачами, связанными с анализом изображений и видео.</a:t>
             </a:r>
@@ -14855,10 +15124,10 @@
               <a:solidFill>
                 <a:srgbClr val="FFFFFF"/>
               </a:solidFill>
-              <a:latin typeface="Lato"/>
-              <a:ea typeface="Lato"/>
-              <a:cs typeface="Lato"/>
-              <a:sym typeface="Lato"/>
+              <a:latin typeface="Times New Roman"/>
+              <a:ea typeface="Times New Roman"/>
+              <a:cs typeface="Times New Roman"/>
+              <a:sym typeface="Times New Roman"/>
             </a:endParaRPr>
           </a:p>
         </p:txBody>
@@ -14962,6 +15231,7 @@
                 <a:srgbClr val="FFFFFF"/>
               </a:buClr>
               <a:buSzPts val="1800"/>
+              <a:buFont typeface="Times New Roman"/>
               <a:buChar char="●"/>
             </a:pPr>
             <a:r>
@@ -14969,6 +15239,10 @@
                 <a:solidFill>
                   <a:srgbClr val="FFFFFF"/>
                 </a:solidFill>
+                <a:latin typeface="Times New Roman"/>
+                <a:ea typeface="Times New Roman"/>
+                <a:cs typeface="Times New Roman"/>
+                <a:sym typeface="Times New Roman"/>
               </a:rPr>
               <a:t>П</a:t>
             </a:r>
@@ -14977,6 +15251,10 @@
                 <a:solidFill>
                   <a:srgbClr val="FFFFFF"/>
                 </a:solidFill>
+                <a:latin typeface="Times New Roman"/>
+                <a:ea typeface="Times New Roman"/>
+                <a:cs typeface="Times New Roman"/>
+                <a:sym typeface="Times New Roman"/>
               </a:rPr>
               <a:t>оиск изображений в </a:t>
             </a:r>
@@ -14985,6 +15263,10 @@
                 <a:solidFill>
                   <a:srgbClr val="FFFFFF"/>
                 </a:solidFill>
+                <a:latin typeface="Times New Roman"/>
+                <a:ea typeface="Times New Roman"/>
+                <a:cs typeface="Times New Roman"/>
+                <a:sym typeface="Times New Roman"/>
               </a:rPr>
             </a:br>
             <a:r>
@@ -14992,6 +15274,10 @@
                 <a:solidFill>
                   <a:srgbClr val="FFFFFF"/>
                 </a:solidFill>
+                <a:latin typeface="Times New Roman"/>
+                <a:ea typeface="Times New Roman"/>
+                <a:cs typeface="Times New Roman"/>
+                <a:sym typeface="Times New Roman"/>
               </a:rPr>
               <a:t>интернете</a:t>
             </a:r>
@@ -14999,6 +15285,10 @@
               <a:solidFill>
                 <a:srgbClr val="FFFFFF"/>
               </a:solidFill>
+              <a:latin typeface="Times New Roman"/>
+              <a:ea typeface="Times New Roman"/>
+              <a:cs typeface="Times New Roman"/>
+              <a:sym typeface="Times New Roman"/>
             </a:endParaRPr>
           </a:p>
           <a:p>
@@ -15013,6 +15303,7 @@
                 <a:srgbClr val="FFFFFF"/>
               </a:buClr>
               <a:buSzPts val="1800"/>
+              <a:buFont typeface="Times New Roman"/>
               <a:buChar char="●"/>
             </a:pPr>
             <a:r>
@@ -15020,6 +15311,10 @@
                 <a:solidFill>
                   <a:srgbClr val="FFFFFF"/>
                 </a:solidFill>
+                <a:latin typeface="Times New Roman"/>
+                <a:ea typeface="Times New Roman"/>
+                <a:cs typeface="Times New Roman"/>
+                <a:sym typeface="Times New Roman"/>
               </a:rPr>
               <a:t>Распознавание текста</a:t>
             </a:r>
@@ -15027,6 +15322,10 @@
               <a:solidFill>
                 <a:srgbClr val="FFFFFF"/>
               </a:solidFill>
+              <a:latin typeface="Times New Roman"/>
+              <a:ea typeface="Times New Roman"/>
+              <a:cs typeface="Times New Roman"/>
+              <a:sym typeface="Times New Roman"/>
             </a:endParaRPr>
           </a:p>
           <a:p>
@@ -15041,6 +15340,7 @@
                 <a:srgbClr val="FFFFFF"/>
               </a:buClr>
               <a:buSzPts val="1800"/>
+              <a:buFont typeface="Times New Roman"/>
               <a:buChar char="●"/>
             </a:pPr>
             <a:r>
@@ -15048,6 +15348,10 @@
                 <a:solidFill>
                   <a:srgbClr val="FFFFFF"/>
                 </a:solidFill>
+                <a:latin typeface="Times New Roman"/>
+                <a:ea typeface="Times New Roman"/>
+                <a:cs typeface="Times New Roman"/>
+                <a:sym typeface="Times New Roman"/>
               </a:rPr>
               <a:t>Биометрия</a:t>
             </a:r>
@@ -15055,6 +15359,10 @@
               <a:solidFill>
                 <a:srgbClr val="FFFFFF"/>
               </a:solidFill>
+              <a:latin typeface="Times New Roman"/>
+              <a:ea typeface="Times New Roman"/>
+              <a:cs typeface="Times New Roman"/>
+              <a:sym typeface="Times New Roman"/>
             </a:endParaRPr>
           </a:p>
           <a:p>
@@ -15069,6 +15377,7 @@
                 <a:srgbClr val="FFFFFF"/>
               </a:buClr>
               <a:buSzPts val="1800"/>
+              <a:buFont typeface="Times New Roman"/>
               <a:buChar char="●"/>
             </a:pPr>
             <a:r>
@@ -15076,6 +15385,10 @@
                 <a:solidFill>
                   <a:srgbClr val="FFFFFF"/>
                 </a:solidFill>
+                <a:latin typeface="Times New Roman"/>
+                <a:ea typeface="Times New Roman"/>
+                <a:cs typeface="Times New Roman"/>
+                <a:sym typeface="Times New Roman"/>
               </a:rPr>
               <a:t>Видеоаналитика</a:t>
             </a:r>
@@ -15083,6 +15396,10 @@
               <a:solidFill>
                 <a:srgbClr val="FFFFFF"/>
               </a:solidFill>
+              <a:latin typeface="Times New Roman"/>
+              <a:ea typeface="Times New Roman"/>
+              <a:cs typeface="Times New Roman"/>
+              <a:sym typeface="Times New Roman"/>
             </a:endParaRPr>
           </a:p>
           <a:p>
@@ -15097,6 +15414,7 @@
                 <a:srgbClr val="FFFFFF"/>
               </a:buClr>
               <a:buSzPts val="1800"/>
+              <a:buFont typeface="Times New Roman"/>
               <a:buChar char="●"/>
             </a:pPr>
             <a:r>
@@ -15104,6 +15422,10 @@
                 <a:solidFill>
                   <a:srgbClr val="FFFFFF"/>
                 </a:solidFill>
+                <a:latin typeface="Times New Roman"/>
+                <a:ea typeface="Times New Roman"/>
+                <a:cs typeface="Times New Roman"/>
+                <a:sym typeface="Times New Roman"/>
               </a:rPr>
               <a:t>Анализ спутниковых снимков</a:t>
             </a:r>
@@ -15111,6 +15433,10 @@
               <a:solidFill>
                 <a:srgbClr val="FFFFFF"/>
               </a:solidFill>
+              <a:latin typeface="Times New Roman"/>
+              <a:ea typeface="Times New Roman"/>
+              <a:cs typeface="Times New Roman"/>
+              <a:sym typeface="Times New Roman"/>
             </a:endParaRPr>
           </a:p>
           <a:p>
@@ -15125,7 +15451,7 @@
                 <a:srgbClr val="FFFFFF"/>
               </a:buClr>
               <a:buSzPts val="1800"/>
-              <a:buFont typeface="Arial"/>
+              <a:buFont typeface="Times New Roman"/>
               <a:buChar char="●"/>
             </a:pPr>
             <a:r>
@@ -15133,6 +15459,10 @@
                 <a:solidFill>
                   <a:srgbClr val="FFFFFF"/>
                 </a:solidFill>
+                <a:latin typeface="Times New Roman"/>
+                <a:ea typeface="Times New Roman"/>
+                <a:cs typeface="Times New Roman"/>
+                <a:sym typeface="Times New Roman"/>
               </a:rPr>
               <a:t>Графические редакторы</a:t>
             </a:r>
@@ -15140,6 +15470,10 @@
               <a:solidFill>
                 <a:srgbClr val="FFFFFF"/>
               </a:solidFill>
+              <a:latin typeface="Times New Roman"/>
+              <a:ea typeface="Times New Roman"/>
+              <a:cs typeface="Times New Roman"/>
+              <a:sym typeface="Times New Roman"/>
             </a:endParaRPr>
           </a:p>
           <a:p>
@@ -15154,6 +15488,7 @@
                 <a:srgbClr val="FFFFFF"/>
               </a:buClr>
               <a:buSzPts val="1800"/>
+              <a:buFont typeface="Times New Roman"/>
               <a:buChar char="●"/>
             </a:pPr>
             <a:r>
@@ -15161,6 +15496,10 @@
                 <a:solidFill>
                   <a:srgbClr val="FFFFFF"/>
                 </a:solidFill>
+                <a:latin typeface="Times New Roman"/>
+                <a:ea typeface="Times New Roman"/>
+                <a:cs typeface="Times New Roman"/>
+                <a:sym typeface="Times New Roman"/>
               </a:rPr>
               <a:t>Управление автомобилем</a:t>
             </a:r>
@@ -15168,6 +15507,10 @@
               <a:solidFill>
                 <a:srgbClr val="FFFFFF"/>
               </a:solidFill>
+              <a:latin typeface="Times New Roman"/>
+              <a:ea typeface="Times New Roman"/>
+              <a:cs typeface="Times New Roman"/>
+              <a:sym typeface="Times New Roman"/>
             </a:endParaRPr>
           </a:p>
           <a:p>
@@ -15185,6 +15528,10 @@
                 <a:solidFill>
                   <a:srgbClr val="FFFFFF"/>
                 </a:solidFill>
+                <a:latin typeface="Times New Roman"/>
+                <a:ea typeface="Times New Roman"/>
+                <a:cs typeface="Times New Roman"/>
+                <a:sym typeface="Times New Roman"/>
               </a:rPr>
               <a:t>И другие...</a:t>
             </a:r>
@@ -15192,6 +15539,10 @@
               <a:solidFill>
                 <a:srgbClr val="FFFFFF"/>
               </a:solidFill>
+              <a:latin typeface="Times New Roman"/>
+              <a:ea typeface="Times New Roman"/>
+              <a:cs typeface="Times New Roman"/>
+              <a:sym typeface="Times New Roman"/>
             </a:endParaRPr>
           </a:p>
         </p:txBody>

</xml_diff>